<commit_message>
저장소 만들기 initial push
</commit_message>
<xml_diff>
--- a/git및github첫걸음2-원격저장소만들기.pptx
+++ b/git및github첫걸음2-원격저장소만들기.pptx
@@ -243,7 +243,7 @@
           <a:p>
             <a:fld id="{A17B9194-BDE3-40E3-983E-94CE6FA773AF}" type="datetimeFigureOut">
               <a:rPr lang="ko-KR" altLang="en-US" smtClean="0"/>
-              <a:t>2021-04-02</a:t>
+              <a:t>2021-04-03</a:t>
             </a:fld>
             <a:endParaRPr lang="ko-KR" altLang="en-US"/>
           </a:p>
@@ -510,6 +510,102 @@
 </p:notesMaster>
 </file>
 
+<file path=ppt/notesSlides/notesSlide1.xml><?xml version="1.0" encoding="utf-8"?>
+<p:notes xmlns:a="http://schemas.openxmlformats.org/drawingml/2006/main" xmlns:r="http://schemas.openxmlformats.org/officeDocument/2006/relationships" xmlns:p="http://schemas.openxmlformats.org/presentationml/2006/main">
+  <p:cSld>
+    <p:spTree>
+      <p:nvGrpSpPr>
+        <p:cNvPr id="1" name=""/>
+        <p:cNvGrpSpPr/>
+        <p:nvPr/>
+      </p:nvGrpSpPr>
+      <p:grpSpPr>
+        <a:xfrm>
+          <a:off x="0" y="0"/>
+          <a:ext cx="0" cy="0"/>
+          <a:chOff x="0" y="0"/>
+          <a:chExt cx="0" cy="0"/>
+        </a:xfrm>
+      </p:grpSpPr>
+      <p:sp>
+        <p:nvSpPr>
+          <p:cNvPr id="2" name="슬라이드 이미지 개체 틀 1"/>
+          <p:cNvSpPr>
+            <a:spLocks noGrp="1" noRot="1" noChangeAspect="1"/>
+          </p:cNvSpPr>
+          <p:nvPr>
+            <p:ph type="sldImg"/>
+          </p:nvPr>
+        </p:nvSpPr>
+        <p:spPr/>
+      </p:sp>
+      <p:sp>
+        <p:nvSpPr>
+          <p:cNvPr id="3" name="슬라이드 노트 개체 틀 2"/>
+          <p:cNvSpPr>
+            <a:spLocks noGrp="1"/>
+          </p:cNvSpPr>
+          <p:nvPr>
+            <p:ph type="body" idx="1"/>
+          </p:nvPr>
+        </p:nvSpPr>
+        <p:spPr/>
+        <p:txBody>
+          <a:bodyPr/>
+          <a:lstStyle/>
+          <a:p>
+            <a:r>
+              <a:rPr lang="ko-KR" altLang="en-US" dirty="0" smtClean="0"/>
+              <a:t>왜 </a:t>
+            </a:r>
+            <a:r>
+              <a:rPr lang="en-US" altLang="ko-KR" dirty="0" smtClean="0"/>
+              <a:t>main</a:t>
+            </a:r>
+            <a:r>
+              <a:rPr lang="ko-KR" altLang="en-US" dirty="0" smtClean="0"/>
+              <a:t>만 올라가 있는지 확이 필요 그런지 확인 필요</a:t>
+            </a:r>
+            <a:endParaRPr lang="ko-KR" altLang="en-US" dirty="0"/>
+          </a:p>
+        </p:txBody>
+      </p:sp>
+      <p:sp>
+        <p:nvSpPr>
+          <p:cNvPr id="4" name="슬라이드 번호 개체 틀 3"/>
+          <p:cNvSpPr>
+            <a:spLocks noGrp="1"/>
+          </p:cNvSpPr>
+          <p:nvPr>
+            <p:ph type="sldNum" sz="quarter" idx="10"/>
+          </p:nvPr>
+        </p:nvSpPr>
+        <p:spPr/>
+        <p:txBody>
+          <a:bodyPr/>
+          <a:lstStyle/>
+          <a:p>
+            <a:fld id="{625D4AC4-540A-4436-887D-BF6A8FCF1275}" type="slidenum">
+              <a:rPr lang="ko-KR" altLang="en-US" smtClean="0"/>
+              <a:t>33</a:t>
+            </a:fld>
+            <a:endParaRPr lang="ko-KR" altLang="en-US"/>
+          </a:p>
+        </p:txBody>
+      </p:sp>
+    </p:spTree>
+    <p:extLst>
+      <p:ext uri="{BB962C8B-B14F-4D97-AF65-F5344CB8AC3E}">
+        <p14:creationId xmlns:p14="http://schemas.microsoft.com/office/powerpoint/2010/main" val="1609432482"/>
+      </p:ext>
+    </p:extLst>
+  </p:cSld>
+  <p:clrMapOvr>
+    <a:masterClrMapping/>
+  </p:clrMapOvr>
+</p:notes>
+</file>
+
 <file path=ppt/slideLayouts/slideLayout1.xml><?xml version="1.0" encoding="utf-8"?>
 <p:sldLayout xmlns:a="http://schemas.openxmlformats.org/drawingml/2006/main" xmlns:r="http://schemas.openxmlformats.org/officeDocument/2006/relationships" xmlns:p="http://schemas.openxmlformats.org/presentationml/2006/main" preserve="1" userDrawn="1">
   <p:cSld name="2_사용자 지정 레이아웃">
@@ -1073,7 +1169,7 @@
           <a:p>
             <a:fld id="{30E72A5D-AC2D-4154-80BD-D3C3745E4EB5}" type="datetimeFigureOut">
               <a:rPr lang="ko-KR" altLang="en-US" smtClean="0"/>
-              <a:t>2021-04-02</a:t>
+              <a:t>2021-04-03</a:t>
             </a:fld>
             <a:endParaRPr lang="ko-KR" altLang="en-US"/>
           </a:p>
@@ -1286,7 +1382,7 @@
           <a:p>
             <a:fld id="{30E72A5D-AC2D-4154-80BD-D3C3745E4EB5}" type="datetimeFigureOut">
               <a:rPr lang="ko-KR" altLang="en-US" smtClean="0"/>
-              <a:t>2021-04-02</a:t>
+              <a:t>2021-04-03</a:t>
             </a:fld>
             <a:endParaRPr lang="ko-KR" altLang="en-US"/>
           </a:p>
@@ -6488,6 +6584,55 @@
           </a:p>
         </p:txBody>
       </p:sp>
+      <p:sp>
+        <p:nvSpPr>
+          <p:cNvPr id="8" name="직사각형 7"/>
+          <p:cNvSpPr/>
+          <p:nvPr/>
+        </p:nvSpPr>
+        <p:spPr>
+          <a:xfrm>
+            <a:off x="8583370" y="2276669"/>
+            <a:ext cx="400768" cy="228601"/>
+          </a:xfrm>
+          <a:prstGeom prst="rect">
+            <a:avLst/>
+          </a:prstGeom>
+          <a:noFill/>
+          <a:ln w="38100">
+            <a:solidFill>
+              <a:srgbClr val="FF0000"/>
+            </a:solidFill>
+          </a:ln>
+        </p:spPr>
+        <p:style>
+          <a:lnRef idx="2">
+            <a:schemeClr val="accent1">
+              <a:shade val="50000"/>
+            </a:schemeClr>
+          </a:lnRef>
+          <a:fillRef idx="1">
+            <a:schemeClr val="accent1"/>
+          </a:fillRef>
+          <a:effectRef idx="0">
+            <a:schemeClr val="accent1"/>
+          </a:effectRef>
+          <a:fontRef idx="minor">
+            <a:schemeClr val="lt1"/>
+          </a:fontRef>
+        </p:style>
+        <p:txBody>
+          <a:bodyPr rtlCol="0" anchor="ctr"/>
+          <a:lstStyle/>
+          <a:p>
+            <a:endParaRPr lang="ko-KR" altLang="en-US" b="1" dirty="0">
+              <a:solidFill>
+                <a:srgbClr val="FF0000"/>
+              </a:solidFill>
+            </a:endParaRPr>
+          </a:p>
+        </p:txBody>
+      </p:sp>
     </p:spTree>
     <p:extLst>
       <p:ext uri="{BB962C8B-B14F-4D97-AF65-F5344CB8AC3E}">
@@ -11181,7 +11326,7 @@
           <p:nvPr/>
         </p:nvPicPr>
         <p:blipFill>
-          <a:blip r:embed="rId2"/>
+          <a:blip r:embed="rId3"/>
           <a:stretch>
             <a:fillRect/>
           </a:stretch>
@@ -11266,7 +11411,7 @@
           <p:nvPr/>
         </p:nvPicPr>
         <p:blipFill>
-          <a:blip r:embed="rId3"/>
+          <a:blip r:embed="rId4"/>
           <a:stretch>
             <a:fillRect/>
           </a:stretch>

</xml_diff>